<commit_message>
update srs usecase diagram
</commit_message>
<xml_diff>
--- a/IS SRS.pptx
+++ b/IS SRS.pptx
@@ -28328,10 +28328,10 @@
       </p:sp>
       <p:pic>
         <p:nvPicPr>
-          <p:cNvPr id="5" name="Picture 4">
+          <p:cNvPr id="4" name="Picture 3">
             <a:extLst>
               <a:ext uri="{FF2B5EF4-FFF2-40B4-BE49-F238E27FC236}">
-                <a16:creationId xmlns:a16="http://schemas.microsoft.com/office/drawing/2014/main" id="{1A46480B-75EA-4676-B341-CD5FC29BE4DA}"/>
+                <a16:creationId xmlns:a16="http://schemas.microsoft.com/office/drawing/2014/main" id="{65829DC7-2E96-492B-AE99-01CBE705CC80}"/>
               </a:ext>
             </a:extLst>
           </p:cNvPr>
@@ -28348,8 +28348,8 @@
         </p:blipFill>
         <p:spPr>
           <a:xfrm>
-            <a:off x="532562" y="924448"/>
-            <a:ext cx="8058779" cy="3953249"/>
+            <a:off x="804862" y="907725"/>
+            <a:ext cx="7534275" cy="4090987"/>
           </a:xfrm>
           <a:prstGeom prst="rect">
             <a:avLst/>

</xml_diff>